<commit_message>
přidány registrace a agendy do prezentace
</commit_message>
<xml_diff>
--- a/docs/Apollo 13 - Logos Polytechnikos.pptx
+++ b/docs/Apollo 13 - Logos Polytechnikos.pptx
@@ -16,11 +16,12 @@
     <p:sldId id="265" r:id="rId10"/>
     <p:sldId id="266" r:id="rId11"/>
     <p:sldId id="271" r:id="rId12"/>
-    <p:sldId id="268" r:id="rId13"/>
-    <p:sldId id="270" r:id="rId14"/>
-    <p:sldId id="267" r:id="rId15"/>
-    <p:sldId id="272" r:id="rId16"/>
-    <p:sldId id="269" r:id="rId17"/>
+    <p:sldId id="273" r:id="rId13"/>
+    <p:sldId id="268" r:id="rId14"/>
+    <p:sldId id="270" r:id="rId15"/>
+    <p:sldId id="267" r:id="rId16"/>
+    <p:sldId id="272" r:id="rId17"/>
+    <p:sldId id="269" r:id="rId18"/>
   </p:sldIdLst>
   <p:sldSz cx="12192000" cy="6858000"/>
   <p:notesSz cx="6858000" cy="9144000"/>
@@ -147,6 +148,7 @@
           <p14:sldIdLst>
             <p14:sldId id="266"/>
             <p14:sldId id="271"/>
+            <p14:sldId id="273"/>
           </p14:sldIdLst>
         </p14:section>
         <p14:section name="design" id="{4D2A7B7A-920F-4346-8C62-FC65054C61E4}">
@@ -7080,7 +7082,10 @@
           <a:bodyPr/>
           <a:lstStyle/>
           <a:p>
-            <a:endParaRPr lang="cs-CZ"/>
+            <a:r>
+              <a:rPr lang="cs-CZ" dirty="0"/>
+              <a:t>registrace</a:t>
+            </a:r>
           </a:p>
         </p:txBody>
       </p:sp>
@@ -7105,10 +7110,84 @@
           <a:bodyPr/>
           <a:lstStyle/>
           <a:p>
-            <a:endParaRPr lang="cs-CZ"/>
+            <a:r>
+              <a:rPr lang="cs-CZ" dirty="0"/>
+              <a:t>Zadání údajů</a:t>
+            </a:r>
+          </a:p>
+          <a:p>
+            <a:pPr lvl="1"/>
+            <a:r>
+              <a:rPr lang="cs-CZ" dirty="0" err="1"/>
+              <a:t>Login</a:t>
+            </a:r>
+            <a:endParaRPr lang="cs-CZ" dirty="0"/>
+          </a:p>
+          <a:p>
+            <a:pPr lvl="1"/>
+            <a:r>
+              <a:rPr lang="cs-CZ" dirty="0"/>
+              <a:t>Email</a:t>
+            </a:r>
+          </a:p>
+          <a:p>
+            <a:pPr lvl="1"/>
+            <a:r>
+              <a:rPr lang="cs-CZ" dirty="0"/>
+              <a:t>Jméno a příjmení</a:t>
+            </a:r>
+          </a:p>
+          <a:p>
+            <a:pPr lvl="1"/>
+            <a:r>
+              <a:rPr lang="cs-CZ" dirty="0"/>
+              <a:t>Heslo</a:t>
+            </a:r>
+          </a:p>
+          <a:p>
+            <a:r>
+              <a:rPr lang="cs-CZ" dirty="0"/>
+              <a:t>Validace </a:t>
+            </a:r>
+          </a:p>
+          <a:p>
+            <a:r>
+              <a:rPr lang="cs-CZ" dirty="0"/>
+              <a:t>Verifikace</a:t>
+            </a:r>
           </a:p>
         </p:txBody>
       </p:sp>
+      <p:pic>
+        <p:nvPicPr>
+          <p:cNvPr id="2" name="Obrázek 1">
+            <a:extLst>
+              <a:ext uri="{FF2B5EF4-FFF2-40B4-BE49-F238E27FC236}">
+                <a16:creationId xmlns:a16="http://schemas.microsoft.com/office/drawing/2014/main" id="{6A9CEBAA-9D7B-40C5-894F-7D82B058732D}"/>
+              </a:ext>
+            </a:extLst>
+          </p:cNvPr>
+          <p:cNvPicPr>
+            <a:picLocks noChangeAspect="1"/>
+          </p:cNvPicPr>
+          <p:nvPr/>
+        </p:nvPicPr>
+        <p:blipFill>
+          <a:blip r:embed="rId2"/>
+          <a:stretch>
+            <a:fillRect/>
+          </a:stretch>
+        </p:blipFill>
+        <p:spPr>
+          <a:xfrm>
+            <a:off x="5711097" y="2444622"/>
+            <a:ext cx="5229225" cy="2571750"/>
+          </a:xfrm>
+          <a:prstGeom prst="rect">
+            <a:avLst/>
+          </a:prstGeom>
+        </p:spPr>
+      </p:pic>
     </p:spTree>
     <p:extLst>
       <p:ext uri="{BB962C8B-B14F-4D97-AF65-F5344CB8AC3E}">
@@ -7123,6 +7202,270 @@
 </file>
 
 <file path=ppt/slides/slide12.xml><?xml version="1.0" encoding="utf-8"?>
+<p:sld xmlns:a="http://schemas.openxmlformats.org/drawingml/2006/main" xmlns:r="http://schemas.openxmlformats.org/officeDocument/2006/relationships" xmlns:p="http://schemas.openxmlformats.org/presentationml/2006/main">
+  <p:cSld>
+    <p:spTree>
+      <p:nvGrpSpPr>
+        <p:cNvPr id="1" name=""/>
+        <p:cNvGrpSpPr/>
+        <p:nvPr/>
+      </p:nvGrpSpPr>
+      <p:grpSpPr>
+        <a:xfrm>
+          <a:off x="0" y="0"/>
+          <a:ext cx="0" cy="0"/>
+          <a:chOff x="0" y="0"/>
+          <a:chExt cx="0" cy="0"/>
+        </a:xfrm>
+      </p:grpSpPr>
+      <p:sp>
+        <p:nvSpPr>
+          <p:cNvPr id="2" name="Nadpis 1">
+            <a:extLst>
+              <a:ext uri="{FF2B5EF4-FFF2-40B4-BE49-F238E27FC236}">
+                <a16:creationId xmlns:a16="http://schemas.microsoft.com/office/drawing/2014/main" id="{7F39BEFF-3992-4EF3-AA1F-F04369C15E46}"/>
+              </a:ext>
+            </a:extLst>
+          </p:cNvPr>
+          <p:cNvSpPr>
+            <a:spLocks noGrp="1"/>
+          </p:cNvSpPr>
+          <p:nvPr>
+            <p:ph type="title"/>
+          </p:nvPr>
+        </p:nvSpPr>
+        <p:spPr/>
+        <p:txBody>
+          <a:bodyPr/>
+          <a:lstStyle/>
+          <a:p>
+            <a:r>
+              <a:rPr lang="cs-CZ" dirty="0"/>
+              <a:t>Agenda redaktora</a:t>
+            </a:r>
+          </a:p>
+        </p:txBody>
+      </p:sp>
+      <p:sp>
+        <p:nvSpPr>
+          <p:cNvPr id="3" name="Zástupný symbol pro obsah 2">
+            <a:extLst>
+              <a:ext uri="{FF2B5EF4-FFF2-40B4-BE49-F238E27FC236}">
+                <a16:creationId xmlns:a16="http://schemas.microsoft.com/office/drawing/2014/main" id="{7D071722-F357-4052-A976-A6C3A1B6937A}"/>
+              </a:ext>
+            </a:extLst>
+          </p:cNvPr>
+          <p:cNvSpPr>
+            <a:spLocks noGrp="1"/>
+          </p:cNvSpPr>
+          <p:nvPr>
+            <p:ph idx="1"/>
+          </p:nvPr>
+        </p:nvSpPr>
+        <p:spPr/>
+        <p:txBody>
+          <a:bodyPr/>
+          <a:lstStyle/>
+          <a:p>
+            <a:r>
+              <a:rPr lang="en-US" dirty="0"/>
+              <a:t>P</a:t>
+            </a:r>
+            <a:r>
+              <a:rPr lang="cs-CZ" dirty="0" err="1"/>
+              <a:t>řehled</a:t>
+            </a:r>
+            <a:r>
+              <a:rPr lang="cs-CZ" dirty="0"/>
+              <a:t> pro šéfredaktora</a:t>
+            </a:r>
+          </a:p>
+          <a:p>
+            <a:r>
+              <a:rPr lang="cs-CZ" dirty="0"/>
+              <a:t>Zobrazení redaktorů</a:t>
+            </a:r>
+          </a:p>
+          <a:p>
+            <a:r>
+              <a:rPr lang="cs-CZ" dirty="0"/>
+              <a:t>Zobrazení práce</a:t>
+            </a:r>
+            <a:endParaRPr lang="en-US" dirty="0"/>
+          </a:p>
+          <a:p>
+            <a:pPr marL="457200" lvl="1" indent="0">
+              <a:buNone/>
+            </a:pPr>
+            <a:r>
+              <a:rPr lang="cs-CZ" dirty="0"/>
+              <a:t>SELECT [User].</a:t>
+            </a:r>
+            <a:r>
+              <a:rPr lang="cs-CZ" dirty="0" err="1"/>
+              <a:t>jmeno</a:t>
+            </a:r>
+            <a:r>
+              <a:rPr lang="cs-CZ" dirty="0"/>
+              <a:t>,[User].</a:t>
+            </a:r>
+            <a:r>
+              <a:rPr lang="cs-CZ" dirty="0" err="1"/>
+              <a:t>prijmeni</a:t>
+            </a:r>
+            <a:r>
+              <a:rPr lang="cs-CZ" dirty="0"/>
+              <a:t>,[</a:t>
+            </a:r>
+            <a:r>
+              <a:rPr lang="cs-CZ" dirty="0" err="1"/>
+              <a:t>Clanek</a:t>
+            </a:r>
+            <a:r>
+              <a:rPr lang="cs-CZ" dirty="0"/>
+              <a:t>].</a:t>
+            </a:r>
+            <a:r>
+              <a:rPr lang="cs-CZ" dirty="0" err="1"/>
+              <a:t>nadpis_clanku</a:t>
+            </a:r>
+            <a:r>
+              <a:rPr lang="cs-CZ" dirty="0"/>
+              <a:t>,[Stav].</a:t>
+            </a:r>
+            <a:r>
+              <a:rPr lang="cs-CZ" dirty="0" err="1"/>
+              <a:t>nazev_stav_cit</a:t>
+            </a:r>
+            <a:endParaRPr lang="cs-CZ" dirty="0"/>
+          </a:p>
+          <a:p>
+            <a:pPr marL="457200" lvl="1" indent="0">
+              <a:buNone/>
+            </a:pPr>
+            <a:r>
+              <a:rPr lang="cs-CZ" dirty="0"/>
+              <a:t>FROM [User] JOIN [</a:t>
+            </a:r>
+            <a:r>
+              <a:rPr lang="cs-CZ" dirty="0" err="1"/>
+              <a:t>Propoj_clanek_oponent</a:t>
+            </a:r>
+            <a:r>
+              <a:rPr lang="cs-CZ" dirty="0"/>
+              <a:t>] ON ([User].</a:t>
+            </a:r>
+            <a:r>
+              <a:rPr lang="cs-CZ" dirty="0" err="1"/>
+              <a:t>id_user</a:t>
+            </a:r>
+            <a:r>
+              <a:rPr lang="cs-CZ" dirty="0"/>
+              <a:t> = [</a:t>
+            </a:r>
+            <a:r>
+              <a:rPr lang="cs-CZ" dirty="0" err="1"/>
+              <a:t>Propoj_clanek_oponent</a:t>
+            </a:r>
+            <a:r>
+              <a:rPr lang="cs-CZ" dirty="0"/>
+              <a:t>].oponent) JOIN [</a:t>
+            </a:r>
+            <a:r>
+              <a:rPr lang="cs-CZ" dirty="0" err="1"/>
+              <a:t>Clanek</a:t>
+            </a:r>
+            <a:r>
+              <a:rPr lang="cs-CZ" dirty="0"/>
+              <a:t>] ON ([</a:t>
+            </a:r>
+            <a:r>
+              <a:rPr lang="cs-CZ" dirty="0" err="1"/>
+              <a:t>Clanek</a:t>
+            </a:r>
+            <a:r>
+              <a:rPr lang="cs-CZ" dirty="0"/>
+              <a:t>].</a:t>
+            </a:r>
+            <a:r>
+              <a:rPr lang="cs-CZ" dirty="0" err="1"/>
+              <a:t>id_clanek</a:t>
+            </a:r>
+            <a:r>
+              <a:rPr lang="cs-CZ" dirty="0"/>
+              <a:t>=[</a:t>
+            </a:r>
+            <a:r>
+              <a:rPr lang="cs-CZ" dirty="0" err="1"/>
+              <a:t>Propoj_clanek_oponent</a:t>
+            </a:r>
+            <a:r>
+              <a:rPr lang="cs-CZ" dirty="0"/>
+              <a:t>].</a:t>
+            </a:r>
+            <a:r>
+              <a:rPr lang="cs-CZ" dirty="0" err="1"/>
+              <a:t>clanek</a:t>
+            </a:r>
+            <a:r>
+              <a:rPr lang="cs-CZ" dirty="0"/>
+              <a:t>) JOIN Stav ON ([</a:t>
+            </a:r>
+            <a:r>
+              <a:rPr lang="cs-CZ" dirty="0" err="1"/>
+              <a:t>Clanek</a:t>
+            </a:r>
+            <a:r>
+              <a:rPr lang="cs-CZ" dirty="0"/>
+              <a:t>].stav=[Stav].</a:t>
+            </a:r>
+            <a:r>
+              <a:rPr lang="cs-CZ" dirty="0" err="1"/>
+              <a:t>id_stav</a:t>
+            </a:r>
+            <a:r>
+              <a:rPr lang="cs-CZ" dirty="0"/>
+              <a:t>)</a:t>
+            </a:r>
+          </a:p>
+          <a:p>
+            <a:pPr marL="457200" lvl="1" indent="0">
+              <a:buNone/>
+            </a:pPr>
+            <a:r>
+              <a:rPr lang="cs-CZ" dirty="0"/>
+              <a:t>WHERE </a:t>
+            </a:r>
+            <a:r>
+              <a:rPr lang="cs-CZ" dirty="0" err="1"/>
+              <a:t>prideleno</a:t>
+            </a:r>
+            <a:r>
+              <a:rPr lang="cs-CZ" dirty="0"/>
+              <a:t>=@</a:t>
+            </a:r>
+            <a:r>
+              <a:rPr lang="cs-CZ" dirty="0" err="1"/>
+              <a:t>prideleno</a:t>
+            </a:r>
+            <a:endParaRPr lang="cs-CZ" dirty="0"/>
+          </a:p>
+        </p:txBody>
+      </p:sp>
+    </p:spTree>
+    <p:extLst>
+      <p:ext uri="{BB962C8B-B14F-4D97-AF65-F5344CB8AC3E}">
+        <p14:creationId xmlns:p14="http://schemas.microsoft.com/office/powerpoint/2010/main" val="661096405"/>
+      </p:ext>
+    </p:extLst>
+  </p:cSld>
+  <p:clrMapOvr>
+    <a:masterClrMapping/>
+  </p:clrMapOvr>
+</p:sld>
+</file>
+
+<file path=ppt/slides/slide13.xml><?xml version="1.0" encoding="utf-8"?>
 <p:sld xmlns:a="http://schemas.openxmlformats.org/drawingml/2006/main" xmlns:r="http://schemas.openxmlformats.org/officeDocument/2006/relationships" xmlns:p="http://schemas.openxmlformats.org/presentationml/2006/main">
   <p:cSld>
     <p:spTree>
@@ -7205,7 +7548,7 @@
 </p:sld>
 </file>
 
-<file path=ppt/slides/slide13.xml><?xml version="1.0" encoding="utf-8"?>
+<file path=ppt/slides/slide14.xml><?xml version="1.0" encoding="utf-8"?>
 <p:sld xmlns:a="http://schemas.openxmlformats.org/drawingml/2006/main" xmlns:r="http://schemas.openxmlformats.org/officeDocument/2006/relationships" xmlns:p="http://schemas.openxmlformats.org/presentationml/2006/main">
   <p:cSld>
     <p:spTree>
@@ -7315,7 +7658,7 @@
 </p:sld>
 </file>
 
-<file path=ppt/slides/slide14.xml><?xml version="1.0" encoding="utf-8"?>
+<file path=ppt/slides/slide15.xml><?xml version="1.0" encoding="utf-8"?>
 <p:sld xmlns:a="http://schemas.openxmlformats.org/drawingml/2006/main" xmlns:r="http://schemas.openxmlformats.org/officeDocument/2006/relationships" xmlns:p="http://schemas.openxmlformats.org/presentationml/2006/main">
   <p:cSld>
     <p:spTree>
@@ -7401,7 +7744,7 @@
 </p:sld>
 </file>
 
-<file path=ppt/slides/slide15.xml><?xml version="1.0" encoding="utf-8"?>
+<file path=ppt/slides/slide16.xml><?xml version="1.0" encoding="utf-8"?>
 <p:sld xmlns:a="http://schemas.openxmlformats.org/drawingml/2006/main" xmlns:r="http://schemas.openxmlformats.org/officeDocument/2006/relationships" xmlns:p="http://schemas.openxmlformats.org/presentationml/2006/main">
   <p:cSld>
     <p:spTree>
@@ -7481,7 +7824,7 @@
 </p:sld>
 </file>
 
-<file path=ppt/slides/slide16.xml><?xml version="1.0" encoding="utf-8"?>
+<file path=ppt/slides/slide17.xml><?xml version="1.0" encoding="utf-8"?>
 <p:sld xmlns:a="http://schemas.openxmlformats.org/drawingml/2006/main" xmlns:r="http://schemas.openxmlformats.org/officeDocument/2006/relationships" xmlns:p="http://schemas.openxmlformats.org/presentationml/2006/main">
   <p:cSld>
     <p:bg>

</xml_diff>

<commit_message>
implementace (Azure) + team member Ondrej Vankat!
</commit_message>
<xml_diff>
--- a/docs/Apollo 13 - Logos Polytechnikos.pptx
+++ b/docs/Apollo 13 - Logos Polytechnikos.pptx
@@ -20,8 +20,9 @@
     <p:sldId id="268" r:id="rId14"/>
     <p:sldId id="270" r:id="rId15"/>
     <p:sldId id="267" r:id="rId16"/>
-    <p:sldId id="272" r:id="rId17"/>
-    <p:sldId id="269" r:id="rId18"/>
+    <p:sldId id="274" r:id="rId17"/>
+    <p:sldId id="275" r:id="rId18"/>
+    <p:sldId id="269" r:id="rId19"/>
   </p:sldIdLst>
   <p:sldSz cx="12192000" cy="6858000"/>
   <p:notesSz cx="6858000" cy="9144000"/>
@@ -160,7 +161,8 @@
         <p14:section name="implementace" id="{B0AF2DCE-D2D3-4485-B978-62F3AA733928}">
           <p14:sldIdLst>
             <p14:sldId id="267"/>
-            <p14:sldId id="272"/>
+            <p14:sldId id="274"/>
+            <p14:sldId id="275"/>
           </p14:sldIdLst>
         </p14:section>
         <p14:section name="konec" id="{88A29760-D472-4996-9B6B-1E1FE2ED67C2}">
@@ -7763,10 +7765,10 @@
       </p:grpSpPr>
       <p:sp>
         <p:nvSpPr>
-          <p:cNvPr id="4" name="Nadpis 3">
+          <p:cNvPr id="2" name="Nadpis 1">
             <a:extLst>
               <a:ext uri="{FF2B5EF4-FFF2-40B4-BE49-F238E27FC236}">
-                <a16:creationId xmlns:a16="http://schemas.microsoft.com/office/drawing/2014/main" id="{6424E668-2F70-4198-97BA-385733A90536}"/>
+                <a16:creationId xmlns:a16="http://schemas.microsoft.com/office/drawing/2014/main" id="{8F63155E-FCD4-4250-BF5F-490A45229C45}"/>
               </a:ext>
             </a:extLst>
           </p:cNvPr>
@@ -7782,16 +7784,241 @@
           <a:bodyPr/>
           <a:lstStyle/>
           <a:p>
-            <a:endParaRPr lang="cs-CZ"/>
+            <a:r>
+              <a:rPr lang="cs-CZ" dirty="0"/>
+              <a:t>Nasazení online (DEPLOY)</a:t>
+            </a:r>
           </a:p>
         </p:txBody>
       </p:sp>
       <p:sp>
         <p:nvSpPr>
-          <p:cNvPr id="5" name="Zástupný symbol pro obsah 4">
+          <p:cNvPr id="3" name="Zástupný symbol pro obsah 2">
             <a:extLst>
               <a:ext uri="{FF2B5EF4-FFF2-40B4-BE49-F238E27FC236}">
-                <a16:creationId xmlns:a16="http://schemas.microsoft.com/office/drawing/2014/main" id="{685A8E39-032A-4398-9E5E-01108BD05980}"/>
+                <a16:creationId xmlns:a16="http://schemas.microsoft.com/office/drawing/2014/main" id="{4ECF4641-EB59-4705-A83B-611E4E11A5BD}"/>
+              </a:ext>
+            </a:extLst>
+          </p:cNvPr>
+          <p:cNvSpPr>
+            <a:spLocks noGrp="1"/>
+          </p:cNvSpPr>
+          <p:nvPr>
+            <p:ph idx="1"/>
+          </p:nvPr>
+        </p:nvSpPr>
+        <p:spPr/>
+        <p:txBody>
+          <a:bodyPr>
+            <a:normAutofit lnSpcReduction="10000"/>
+          </a:bodyPr>
+          <a:lstStyle/>
+          <a:p>
+            <a:pPr marL="514350" indent="-514350">
+              <a:lnSpc>
+                <a:spcPct val="150000"/>
+              </a:lnSpc>
+              <a:buFont typeface="+mj-lt"/>
+              <a:buAutoNum type="arabicPeriod"/>
+            </a:pPr>
+            <a:r>
+              <a:rPr lang="cs-CZ" dirty="0"/>
+              <a:t>účet ve službě Azure</a:t>
+            </a:r>
+          </a:p>
+          <a:p>
+            <a:pPr marL="514350" indent="-514350">
+              <a:lnSpc>
+                <a:spcPct val="150000"/>
+              </a:lnSpc>
+              <a:buFont typeface="+mj-lt"/>
+              <a:buAutoNum type="arabicPeriod"/>
+            </a:pPr>
+            <a:endParaRPr lang="cs-CZ" dirty="0"/>
+          </a:p>
+          <a:p>
+            <a:pPr marL="514350" indent="-514350">
+              <a:lnSpc>
+                <a:spcPct val="100000"/>
+              </a:lnSpc>
+              <a:buFont typeface="+mj-lt"/>
+              <a:buAutoNum type="arabicPeriod"/>
+            </a:pPr>
+            <a:r>
+              <a:rPr lang="cs-CZ" dirty="0" err="1"/>
+              <a:t>Visual</a:t>
+            </a:r>
+            <a:r>
+              <a:rPr lang="cs-CZ" dirty="0"/>
+              <a:t> Studio - publikovat:</a:t>
+            </a:r>
+          </a:p>
+          <a:p>
+            <a:pPr lvl="1">
+              <a:lnSpc>
+                <a:spcPct val="100000"/>
+              </a:lnSpc>
+            </a:pPr>
+            <a:r>
+              <a:rPr lang="cs-CZ" dirty="0"/>
+              <a:t>projekt</a:t>
+            </a:r>
+          </a:p>
+          <a:p>
+            <a:pPr lvl="1">
+              <a:lnSpc>
+                <a:spcPct val="100000"/>
+              </a:lnSpc>
+            </a:pPr>
+            <a:r>
+              <a:rPr lang="cs-CZ" dirty="0"/>
+              <a:t>databázi</a:t>
+            </a:r>
+          </a:p>
+          <a:p>
+            <a:pPr lvl="1">
+              <a:lnSpc>
+                <a:spcPct val="100000"/>
+              </a:lnSpc>
+            </a:pPr>
+            <a:endParaRPr lang="cs-CZ" dirty="0"/>
+          </a:p>
+          <a:p>
+            <a:pPr marL="514350" indent="-514350">
+              <a:lnSpc>
+                <a:spcPct val="100000"/>
+              </a:lnSpc>
+              <a:buFont typeface="+mj-lt"/>
+              <a:buAutoNum type="arabicPeriod"/>
+            </a:pPr>
+            <a:r>
+              <a:rPr lang="cs-CZ" dirty="0"/>
+              <a:t>Překopírovat obsah DB</a:t>
+            </a:r>
+          </a:p>
+          <a:p>
+            <a:pPr lvl="1">
+              <a:lnSpc>
+                <a:spcPct val="100000"/>
+              </a:lnSpc>
+            </a:pPr>
+            <a:r>
+              <a:rPr lang="cs-CZ" dirty="0"/>
+              <a:t>struktura</a:t>
+            </a:r>
+          </a:p>
+          <a:p>
+            <a:pPr lvl="1">
+              <a:lnSpc>
+                <a:spcPct val="100000"/>
+              </a:lnSpc>
+            </a:pPr>
+            <a:r>
+              <a:rPr lang="cs-CZ" dirty="0"/>
+              <a:t>data</a:t>
+            </a:r>
+          </a:p>
+        </p:txBody>
+      </p:sp>
+      <p:pic>
+        <p:nvPicPr>
+          <p:cNvPr id="4" name="Obrázek 3">
+            <a:extLst>
+              <a:ext uri="{FF2B5EF4-FFF2-40B4-BE49-F238E27FC236}">
+                <a16:creationId xmlns:a16="http://schemas.microsoft.com/office/drawing/2014/main" id="{C092F47A-97FC-4C9E-BBA6-566EBDA7B5F3}"/>
+              </a:ext>
+            </a:extLst>
+          </p:cNvPr>
+          <p:cNvPicPr>
+            <a:picLocks noChangeAspect="1"/>
+          </p:cNvPicPr>
+          <p:nvPr/>
+        </p:nvPicPr>
+        <p:blipFill>
+          <a:blip r:embed="rId2"/>
+          <a:stretch>
+            <a:fillRect/>
+          </a:stretch>
+        </p:blipFill>
+        <p:spPr>
+          <a:xfrm>
+            <a:off x="5334256" y="1845593"/>
+            <a:ext cx="6565136" cy="4033999"/>
+          </a:xfrm>
+          <a:prstGeom prst="rect">
+            <a:avLst/>
+          </a:prstGeom>
+          <a:ln>
+            <a:solidFill>
+              <a:schemeClr val="tx1"/>
+            </a:solidFill>
+          </a:ln>
+        </p:spPr>
+      </p:pic>
+    </p:spTree>
+    <p:extLst>
+      <p:ext uri="{BB962C8B-B14F-4D97-AF65-F5344CB8AC3E}">
+        <p14:creationId xmlns:p14="http://schemas.microsoft.com/office/powerpoint/2010/main" val="3057881380"/>
+      </p:ext>
+    </p:extLst>
+  </p:cSld>
+  <p:clrMapOvr>
+    <a:masterClrMapping/>
+  </p:clrMapOvr>
+</p:sld>
+</file>
+
+<file path=ppt/slides/slide17.xml><?xml version="1.0" encoding="utf-8"?>
+<p:sld xmlns:a="http://schemas.openxmlformats.org/drawingml/2006/main" xmlns:r="http://schemas.openxmlformats.org/officeDocument/2006/relationships" xmlns:p="http://schemas.openxmlformats.org/presentationml/2006/main">
+  <p:cSld>
+    <p:spTree>
+      <p:nvGrpSpPr>
+        <p:cNvPr id="1" name=""/>
+        <p:cNvGrpSpPr/>
+        <p:nvPr/>
+      </p:nvGrpSpPr>
+      <p:grpSpPr>
+        <a:xfrm>
+          <a:off x="0" y="0"/>
+          <a:ext cx="0" cy="0"/>
+          <a:chOff x="0" y="0"/>
+          <a:chExt cx="0" cy="0"/>
+        </a:xfrm>
+      </p:grpSpPr>
+      <p:sp>
+        <p:nvSpPr>
+          <p:cNvPr id="2" name="Nadpis 1">
+            <a:extLst>
+              <a:ext uri="{FF2B5EF4-FFF2-40B4-BE49-F238E27FC236}">
+                <a16:creationId xmlns:a16="http://schemas.microsoft.com/office/drawing/2014/main" id="{0BF199A5-8F9E-4476-BE31-12E1A53203E4}"/>
+              </a:ext>
+            </a:extLst>
+          </p:cNvPr>
+          <p:cNvSpPr>
+            <a:spLocks noGrp="1"/>
+          </p:cNvSpPr>
+          <p:nvPr>
+            <p:ph type="title"/>
+          </p:nvPr>
+        </p:nvSpPr>
+        <p:spPr/>
+        <p:txBody>
+          <a:bodyPr/>
+          <a:lstStyle/>
+          <a:p>
+            <a:r>
+              <a:rPr lang="cs-CZ" dirty="0"/>
+              <a:t>Změna kódu + opakované nasazení</a:t>
+            </a:r>
+          </a:p>
+        </p:txBody>
+      </p:sp>
+      <p:sp>
+        <p:nvSpPr>
+          <p:cNvPr id="3" name="Zástupný symbol pro obsah 2">
+            <a:extLst>
+              <a:ext uri="{FF2B5EF4-FFF2-40B4-BE49-F238E27FC236}">
+                <a16:creationId xmlns:a16="http://schemas.microsoft.com/office/drawing/2014/main" id="{BFED2CB1-2532-4F22-B996-C2A6308DD1D7}"/>
               </a:ext>
             </a:extLst>
           </p:cNvPr>
@@ -7807,14 +8034,122 @@
           <a:bodyPr/>
           <a:lstStyle/>
           <a:p>
-            <a:endParaRPr lang="cs-CZ"/>
+            <a:pPr>
+              <a:lnSpc>
+                <a:spcPct val="150000"/>
+              </a:lnSpc>
+            </a:pPr>
+            <a:r>
+              <a:rPr lang="cs-CZ" dirty="0"/>
+              <a:t>DB – </a:t>
+            </a:r>
+            <a:r>
+              <a:rPr lang="cs-CZ" dirty="0" err="1"/>
+              <a:t>Visual</a:t>
+            </a:r>
+            <a:r>
+              <a:rPr lang="cs-CZ" dirty="0"/>
+              <a:t> Studio – připojení na DB v Azure</a:t>
+            </a:r>
+          </a:p>
+          <a:p>
+            <a:pPr>
+              <a:lnSpc>
+                <a:spcPct val="150000"/>
+              </a:lnSpc>
+            </a:pPr>
+            <a:endParaRPr lang="cs-CZ" dirty="0"/>
+          </a:p>
+          <a:p>
+            <a:pPr>
+              <a:lnSpc>
+                <a:spcPct val="150000"/>
+              </a:lnSpc>
+            </a:pPr>
+            <a:r>
+              <a:rPr lang="cs-CZ" dirty="0"/>
+              <a:t>kód – </a:t>
+            </a:r>
+            <a:r>
+              <a:rPr lang="cs-CZ" dirty="0" err="1"/>
+              <a:t>Visual</a:t>
+            </a:r>
+            <a:r>
+              <a:rPr lang="cs-CZ" dirty="0"/>
+              <a:t> Studio – publikovat</a:t>
+            </a:r>
+          </a:p>
+          <a:p>
+            <a:pPr marL="265113" indent="0">
+              <a:lnSpc>
+                <a:spcPct val="150000"/>
+              </a:lnSpc>
+              <a:buNone/>
+            </a:pPr>
+            <a:r>
+              <a:rPr lang="cs-CZ" dirty="0"/>
+              <a:t>VS.</a:t>
+            </a:r>
+          </a:p>
+          <a:p>
+            <a:pPr>
+              <a:lnSpc>
+                <a:spcPct val="150000"/>
+              </a:lnSpc>
+            </a:pPr>
+            <a:r>
+              <a:rPr lang="cs-CZ" dirty="0" err="1"/>
+              <a:t>GitHub</a:t>
+            </a:r>
+            <a:r>
+              <a:rPr lang="cs-CZ" dirty="0"/>
+              <a:t> – zdroj kódu</a:t>
+            </a:r>
+          </a:p>
+          <a:p>
+            <a:endParaRPr lang="cs-CZ" dirty="0"/>
           </a:p>
         </p:txBody>
       </p:sp>
+      <p:pic>
+        <p:nvPicPr>
+          <p:cNvPr id="4" name="Obrázek 3">
+            <a:extLst>
+              <a:ext uri="{FF2B5EF4-FFF2-40B4-BE49-F238E27FC236}">
+                <a16:creationId xmlns:a16="http://schemas.microsoft.com/office/drawing/2014/main" id="{3B9D16F2-3D3C-42CE-8EE4-05E7B5FA6246}"/>
+              </a:ext>
+            </a:extLst>
+          </p:cNvPr>
+          <p:cNvPicPr>
+            <a:picLocks noChangeAspect="1"/>
+          </p:cNvPicPr>
+          <p:nvPr/>
+        </p:nvPicPr>
+        <p:blipFill>
+          <a:blip r:embed="rId2"/>
+          <a:stretch>
+            <a:fillRect/>
+          </a:stretch>
+        </p:blipFill>
+        <p:spPr>
+          <a:xfrm>
+            <a:off x="8092440" y="1690688"/>
+            <a:ext cx="3331464" cy="4594538"/>
+          </a:xfrm>
+          <a:prstGeom prst="rect">
+            <a:avLst/>
+          </a:prstGeom>
+          <a:ln>
+            <a:solidFill>
+              <a:schemeClr val="tx1"/>
+            </a:solidFill>
+          </a:ln>
+        </p:spPr>
+      </p:pic>
     </p:spTree>
     <p:extLst>
       <p:ext uri="{BB962C8B-B14F-4D97-AF65-F5344CB8AC3E}">
-        <p14:creationId xmlns:p14="http://schemas.microsoft.com/office/powerpoint/2010/main" val="3481639115"/>
+        <p14:creationId xmlns:p14="http://schemas.microsoft.com/office/powerpoint/2010/main" val="408922911"/>
       </p:ext>
     </p:extLst>
   </p:cSld>
@@ -7824,7 +8159,7 @@
 </p:sld>
 </file>
 
-<file path=ppt/slides/slide17.xml><?xml version="1.0" encoding="utf-8"?>
+<file path=ppt/slides/slide18.xml><?xml version="1.0" encoding="utf-8"?>
 <p:sld xmlns:a="http://schemas.openxmlformats.org/drawingml/2006/main" xmlns:r="http://schemas.openxmlformats.org/officeDocument/2006/relationships" xmlns:p="http://schemas.openxmlformats.org/presentationml/2006/main">
   <p:cSld>
     <p:bg>
@@ -20859,29 +21194,36 @@
           <a:lstStyle/>
           <a:p>
             <a:r>
-              <a:rPr lang="cs-CZ"/>
+              <a:rPr lang="cs-CZ" dirty="0"/>
               <a:t>TEAM MEMBER</a:t>
             </a:r>
           </a:p>
           <a:p>
             <a:pPr lvl="1"/>
             <a:r>
-              <a:rPr lang="cs-CZ"/>
+              <a:rPr lang="cs-CZ" dirty="0"/>
               <a:t>JÁCHYM HRUŠKA</a:t>
             </a:r>
           </a:p>
           <a:p>
             <a:pPr lvl="1"/>
             <a:r>
-              <a:rPr lang="cs-CZ"/>
+              <a:rPr lang="cs-CZ" dirty="0"/>
               <a:t>DOMINIK BULA</a:t>
             </a:r>
           </a:p>
           <a:p>
             <a:pPr lvl="1"/>
             <a:r>
+              <a:rPr lang="cs-CZ" dirty="0"/>
+              <a:t>VÍT ŠTĚPÁNEK</a:t>
+            </a:r>
+          </a:p>
+          <a:p>
+            <a:pPr lvl="1"/>
+            <a:r>
               <a:rPr lang="cs-CZ"/>
-              <a:t>VÍT ŠTĚPÁNEK</a:t>
+              <a:t>ONDŘEJ VAŇKÁT</a:t>
             </a:r>
             <a:endParaRPr lang="cs-CZ" dirty="0"/>
           </a:p>

</xml_diff>

<commit_message>
prezentace - login, redaktor;fancy url, zabezpeceni stranek, zasifrovani ConnectionStringu, restrukturalizace
</commit_message>
<xml_diff>
--- a/docs/Apollo 13 - Logos Polytechnikos.pptx
+++ b/docs/Apollo 13 - Logos Polytechnikos.pptx
@@ -18,13 +18,15 @@
     <p:sldId id="266" r:id="rId12"/>
     <p:sldId id="277" r:id="rId13"/>
     <p:sldId id="271" r:id="rId14"/>
-    <p:sldId id="273" r:id="rId15"/>
-    <p:sldId id="268" r:id="rId16"/>
-    <p:sldId id="270" r:id="rId17"/>
-    <p:sldId id="267" r:id="rId18"/>
-    <p:sldId id="274" r:id="rId19"/>
-    <p:sldId id="275" r:id="rId20"/>
-    <p:sldId id="269" r:id="rId21"/>
+    <p:sldId id="279" r:id="rId15"/>
+    <p:sldId id="280" r:id="rId16"/>
+    <p:sldId id="273" r:id="rId17"/>
+    <p:sldId id="268" r:id="rId18"/>
+    <p:sldId id="270" r:id="rId19"/>
+    <p:sldId id="267" r:id="rId20"/>
+    <p:sldId id="274" r:id="rId21"/>
+    <p:sldId id="275" r:id="rId22"/>
+    <p:sldId id="269" r:id="rId23"/>
   </p:sldIdLst>
   <p:sldSz cx="12192000" cy="6858000"/>
   <p:notesSz cx="6858000" cy="9144000"/>
@@ -153,6 +155,8 @@
             <p14:sldId id="266"/>
             <p14:sldId id="277"/>
             <p14:sldId id="271"/>
+            <p14:sldId id="279"/>
+            <p14:sldId id="280"/>
             <p14:sldId id="273"/>
           </p14:sldIdLst>
         </p14:section>
@@ -7045,8 +7049,8 @@
         </p:blipFill>
         <p:spPr>
           <a:xfrm>
-            <a:off x="1423474" y="1223763"/>
-            <a:ext cx="9345052" cy="5550820"/>
+            <a:off x="1513180" y="1223763"/>
+            <a:ext cx="9165639" cy="5550820"/>
           </a:xfrm>
         </p:spPr>
       </p:pic>
@@ -7462,6 +7466,348 @@
           <p:cNvPr id="2" name="Nadpis 1">
             <a:extLst>
               <a:ext uri="{FF2B5EF4-FFF2-40B4-BE49-F238E27FC236}">
+                <a16:creationId xmlns:a16="http://schemas.microsoft.com/office/drawing/2014/main" id="{51585C7B-5AF3-4731-BBA3-3D30E6500E40}"/>
+              </a:ext>
+            </a:extLst>
+          </p:cNvPr>
+          <p:cNvSpPr>
+            <a:spLocks noGrp="1"/>
+          </p:cNvSpPr>
+          <p:nvPr>
+            <p:ph type="title"/>
+          </p:nvPr>
+        </p:nvSpPr>
+        <p:spPr/>
+        <p:txBody>
+          <a:bodyPr/>
+          <a:lstStyle/>
+          <a:p>
+            <a:r>
+              <a:rPr lang="cs-CZ" dirty="0"/>
+              <a:t>Přihlášení</a:t>
+            </a:r>
+          </a:p>
+        </p:txBody>
+      </p:sp>
+      <p:sp>
+        <p:nvSpPr>
+          <p:cNvPr id="3" name="Zástupný symbol pro obsah 2">
+            <a:extLst>
+              <a:ext uri="{FF2B5EF4-FFF2-40B4-BE49-F238E27FC236}">
+                <a16:creationId xmlns:a16="http://schemas.microsoft.com/office/drawing/2014/main" id="{462BCD13-0D89-4822-9BEA-C0E9E5E7D008}"/>
+              </a:ext>
+            </a:extLst>
+          </p:cNvPr>
+          <p:cNvSpPr>
+            <a:spLocks noGrp="1"/>
+          </p:cNvSpPr>
+          <p:nvPr>
+            <p:ph idx="1"/>
+          </p:nvPr>
+        </p:nvSpPr>
+        <p:spPr/>
+        <p:txBody>
+          <a:bodyPr/>
+          <a:lstStyle/>
+          <a:p>
+            <a:r>
+              <a:rPr lang="cs-CZ" dirty="0"/>
+              <a:t>Přihlašovací formulář</a:t>
+            </a:r>
+          </a:p>
+          <a:p>
+            <a:pPr lvl="1"/>
+            <a:r>
+              <a:rPr lang="cs-CZ" dirty="0"/>
+              <a:t>Login</a:t>
+            </a:r>
+          </a:p>
+          <a:p>
+            <a:pPr lvl="1"/>
+            <a:r>
+              <a:rPr lang="cs-CZ" dirty="0"/>
+              <a:t>Heslo</a:t>
+            </a:r>
+          </a:p>
+          <a:p>
+            <a:endParaRPr lang="cs-CZ" dirty="0"/>
+          </a:p>
+          <a:p>
+            <a:r>
+              <a:rPr lang="cs-CZ" dirty="0"/>
+              <a:t>Verifikace údajů</a:t>
+            </a:r>
+          </a:p>
+        </p:txBody>
+      </p:sp>
+      <p:pic>
+        <p:nvPicPr>
+          <p:cNvPr id="4" name="Obrázek 3">
+            <a:extLst>
+              <a:ext uri="{FF2B5EF4-FFF2-40B4-BE49-F238E27FC236}">
+                <a16:creationId xmlns:a16="http://schemas.microsoft.com/office/drawing/2014/main" id="{360A9A99-0F6C-4638-8891-2281DA672606}"/>
+              </a:ext>
+            </a:extLst>
+          </p:cNvPr>
+          <p:cNvPicPr>
+            <a:picLocks noChangeAspect="1"/>
+          </p:cNvPicPr>
+          <p:nvPr/>
+        </p:nvPicPr>
+        <p:blipFill>
+          <a:blip r:embed="rId2"/>
+          <a:stretch>
+            <a:fillRect/>
+          </a:stretch>
+        </p:blipFill>
+        <p:spPr>
+          <a:xfrm>
+            <a:off x="7123835" y="1325875"/>
+            <a:ext cx="4401703" cy="2600321"/>
+          </a:xfrm>
+          <a:prstGeom prst="rect">
+            <a:avLst/>
+          </a:prstGeom>
+        </p:spPr>
+      </p:pic>
+      <p:pic>
+        <p:nvPicPr>
+          <p:cNvPr id="5" name="Obrázek 4">
+            <a:extLst>
+              <a:ext uri="{FF2B5EF4-FFF2-40B4-BE49-F238E27FC236}">
+                <a16:creationId xmlns:a16="http://schemas.microsoft.com/office/drawing/2014/main" id="{A1ED14D6-C771-4D1E-BAD5-4C1D55DD2735}"/>
+              </a:ext>
+            </a:extLst>
+          </p:cNvPr>
+          <p:cNvPicPr>
+            <a:picLocks noChangeAspect="1"/>
+          </p:cNvPicPr>
+          <p:nvPr/>
+        </p:nvPicPr>
+        <p:blipFill>
+          <a:blip r:embed="rId3"/>
+          <a:stretch>
+            <a:fillRect/>
+          </a:stretch>
+        </p:blipFill>
+        <p:spPr>
+          <a:xfrm>
+            <a:off x="4828191" y="4231964"/>
+            <a:ext cx="6697347" cy="1793932"/>
+          </a:xfrm>
+          <a:prstGeom prst="rect">
+            <a:avLst/>
+          </a:prstGeom>
+        </p:spPr>
+      </p:pic>
+    </p:spTree>
+    <p:extLst>
+      <p:ext uri="{BB962C8B-B14F-4D97-AF65-F5344CB8AC3E}">
+        <p14:creationId xmlns:p14="http://schemas.microsoft.com/office/powerpoint/2010/main" val="1726828736"/>
+      </p:ext>
+    </p:extLst>
+  </p:cSld>
+  <p:clrMapOvr>
+    <a:masterClrMapping/>
+  </p:clrMapOvr>
+</p:sld>
+</file>
+
+<file path=ppt/slides/slide15.xml><?xml version="1.0" encoding="utf-8"?>
+<p:sld xmlns:a="http://schemas.openxmlformats.org/drawingml/2006/main" xmlns:r="http://schemas.openxmlformats.org/officeDocument/2006/relationships" xmlns:p="http://schemas.openxmlformats.org/presentationml/2006/main">
+  <p:cSld>
+    <p:spTree>
+      <p:nvGrpSpPr>
+        <p:cNvPr id="1" name=""/>
+        <p:cNvGrpSpPr/>
+        <p:nvPr/>
+      </p:nvGrpSpPr>
+      <p:grpSpPr>
+        <a:xfrm>
+          <a:off x="0" y="0"/>
+          <a:ext cx="0" cy="0"/>
+          <a:chOff x="0" y="0"/>
+          <a:chExt cx="0" cy="0"/>
+        </a:xfrm>
+      </p:grpSpPr>
+      <p:sp>
+        <p:nvSpPr>
+          <p:cNvPr id="2" name="Nadpis 1">
+            <a:extLst>
+              <a:ext uri="{FF2B5EF4-FFF2-40B4-BE49-F238E27FC236}">
+                <a16:creationId xmlns:a16="http://schemas.microsoft.com/office/drawing/2014/main" id="{EFC2F836-5830-4DA3-BE1F-B2AF9840DE4C}"/>
+              </a:ext>
+            </a:extLst>
+          </p:cNvPr>
+          <p:cNvSpPr>
+            <a:spLocks noGrp="1"/>
+          </p:cNvSpPr>
+          <p:nvPr>
+            <p:ph type="title"/>
+          </p:nvPr>
+        </p:nvSpPr>
+        <p:spPr/>
+        <p:txBody>
+          <a:bodyPr/>
+          <a:lstStyle/>
+          <a:p>
+            <a:r>
+              <a:rPr lang="cs-CZ" dirty="0"/>
+              <a:t>Odeslání článku oponentovi</a:t>
+            </a:r>
+          </a:p>
+        </p:txBody>
+      </p:sp>
+      <p:sp>
+        <p:nvSpPr>
+          <p:cNvPr id="3" name="Zástupný symbol pro obsah 2">
+            <a:extLst>
+              <a:ext uri="{FF2B5EF4-FFF2-40B4-BE49-F238E27FC236}">
+                <a16:creationId xmlns:a16="http://schemas.microsoft.com/office/drawing/2014/main" id="{FE45934A-11ED-4A08-B01E-0AC13708EE39}"/>
+              </a:ext>
+            </a:extLst>
+          </p:cNvPr>
+          <p:cNvSpPr>
+            <a:spLocks noGrp="1"/>
+          </p:cNvSpPr>
+          <p:nvPr>
+            <p:ph idx="1"/>
+          </p:nvPr>
+        </p:nvSpPr>
+        <p:spPr/>
+        <p:txBody>
+          <a:bodyPr/>
+          <a:lstStyle/>
+          <a:p>
+            <a:pPr>
+              <a:lnSpc>
+                <a:spcPct val="250000"/>
+              </a:lnSpc>
+            </a:pPr>
+            <a:r>
+              <a:rPr lang="cs-CZ" dirty="0"/>
+              <a:t>Výběr článku</a:t>
+            </a:r>
+          </a:p>
+          <a:p>
+            <a:pPr>
+              <a:lnSpc>
+                <a:spcPct val="250000"/>
+              </a:lnSpc>
+            </a:pPr>
+            <a:r>
+              <a:rPr lang="cs-CZ" dirty="0"/>
+              <a:t>Nastavení oponenta</a:t>
+            </a:r>
+          </a:p>
+          <a:p>
+            <a:pPr>
+              <a:lnSpc>
+                <a:spcPct val="250000"/>
+              </a:lnSpc>
+            </a:pPr>
+            <a:r>
+              <a:rPr lang="cs-CZ" dirty="0"/>
+              <a:t>Nastavení časového okna</a:t>
+            </a:r>
+          </a:p>
+        </p:txBody>
+      </p:sp>
+      <p:pic>
+        <p:nvPicPr>
+          <p:cNvPr id="5" name="Obrázek 4">
+            <a:extLst>
+              <a:ext uri="{FF2B5EF4-FFF2-40B4-BE49-F238E27FC236}">
+                <a16:creationId xmlns:a16="http://schemas.microsoft.com/office/drawing/2014/main" id="{30115606-58B2-4ED3-9DE8-3AFC8C5C7695}"/>
+              </a:ext>
+            </a:extLst>
+          </p:cNvPr>
+          <p:cNvPicPr>
+            <a:picLocks noChangeAspect="1"/>
+          </p:cNvPicPr>
+          <p:nvPr/>
+        </p:nvPicPr>
+        <p:blipFill>
+          <a:blip r:embed="rId2"/>
+          <a:stretch>
+            <a:fillRect/>
+          </a:stretch>
+        </p:blipFill>
+        <p:spPr>
+          <a:xfrm>
+            <a:off x="6742152" y="1260155"/>
+            <a:ext cx="3608856" cy="2207133"/>
+          </a:xfrm>
+          <a:prstGeom prst="rect">
+            <a:avLst/>
+          </a:prstGeom>
+        </p:spPr>
+      </p:pic>
+      <p:pic>
+        <p:nvPicPr>
+          <p:cNvPr id="6" name="Obrázek 5">
+            <a:extLst>
+              <a:ext uri="{FF2B5EF4-FFF2-40B4-BE49-F238E27FC236}">
+                <a16:creationId xmlns:a16="http://schemas.microsoft.com/office/drawing/2014/main" id="{1429C508-683A-4398-A1B1-2712D227392F}"/>
+              </a:ext>
+            </a:extLst>
+          </p:cNvPr>
+          <p:cNvPicPr>
+            <a:picLocks noChangeAspect="1"/>
+          </p:cNvPicPr>
+          <p:nvPr/>
+        </p:nvPicPr>
+        <p:blipFill>
+          <a:blip r:embed="rId3"/>
+          <a:stretch>
+            <a:fillRect/>
+          </a:stretch>
+        </p:blipFill>
+        <p:spPr>
+          <a:xfrm>
+            <a:off x="6490513" y="3661398"/>
+            <a:ext cx="4112133" cy="3196602"/>
+          </a:xfrm>
+          <a:prstGeom prst="rect">
+            <a:avLst/>
+          </a:prstGeom>
+        </p:spPr>
+      </p:pic>
+    </p:spTree>
+    <p:extLst>
+      <p:ext uri="{BB962C8B-B14F-4D97-AF65-F5344CB8AC3E}">
+        <p14:creationId xmlns:p14="http://schemas.microsoft.com/office/powerpoint/2010/main" val="639889924"/>
+      </p:ext>
+    </p:extLst>
+  </p:cSld>
+  <p:clrMapOvr>
+    <a:masterClrMapping/>
+  </p:clrMapOvr>
+</p:sld>
+</file>
+
+<file path=ppt/slides/slide16.xml><?xml version="1.0" encoding="utf-8"?>
+<p:sld xmlns:a="http://schemas.openxmlformats.org/drawingml/2006/main" xmlns:r="http://schemas.openxmlformats.org/officeDocument/2006/relationships" xmlns:p="http://schemas.openxmlformats.org/presentationml/2006/main">
+  <p:cSld>
+    <p:spTree>
+      <p:nvGrpSpPr>
+        <p:cNvPr id="1" name=""/>
+        <p:cNvGrpSpPr/>
+        <p:nvPr/>
+      </p:nvGrpSpPr>
+      <p:grpSpPr>
+        <a:xfrm>
+          <a:off x="0" y="0"/>
+          <a:ext cx="0" cy="0"/>
+          <a:chOff x="0" y="0"/>
+          <a:chExt cx="0" cy="0"/>
+        </a:xfrm>
+      </p:grpSpPr>
+      <p:sp>
+        <p:nvSpPr>
+          <p:cNvPr id="2" name="Nadpis 1">
+            <a:extLst>
+              <a:ext uri="{FF2B5EF4-FFF2-40B4-BE49-F238E27FC236}">
                 <a16:creationId xmlns:a16="http://schemas.microsoft.com/office/drawing/2014/main" id="{7F39BEFF-3992-4EF3-AA1F-F04369C15E46}"/>
               </a:ext>
             </a:extLst>
@@ -7699,7 +8045,7 @@
 </p:sld>
 </file>
 
-<file path=ppt/slides/slide15.xml><?xml version="1.0" encoding="utf-8"?>
+<file path=ppt/slides/slide17.xml><?xml version="1.0" encoding="utf-8"?>
 <p:sld xmlns:a="http://schemas.openxmlformats.org/drawingml/2006/main" xmlns:r="http://schemas.openxmlformats.org/officeDocument/2006/relationships" xmlns:p="http://schemas.openxmlformats.org/presentationml/2006/main">
   <p:cSld>
     <p:spTree>
@@ -7739,7 +8085,7 @@
           <a:p>
             <a:r>
               <a:rPr lang="cs-CZ" dirty="0"/>
-              <a:t>DESING</a:t>
+              <a:t>DESIGN</a:t>
             </a:r>
           </a:p>
         </p:txBody>
@@ -7785,7 +8131,7 @@
 </p:sld>
 </file>
 
-<file path=ppt/slides/slide16.xml><?xml version="1.0" encoding="utf-8"?>
+<file path=ppt/slides/slide18.xml><?xml version="1.0" encoding="utf-8"?>
 <p:sld xmlns:a="http://schemas.openxmlformats.org/drawingml/2006/main" xmlns:r="http://schemas.openxmlformats.org/officeDocument/2006/relationships" xmlns:p="http://schemas.openxmlformats.org/presentationml/2006/main">
   <p:cSld>
     <p:spTree>
@@ -7898,7 +8244,7 @@
 </p:sld>
 </file>
 
-<file path=ppt/slides/slide17.xml><?xml version="1.0" encoding="utf-8"?>
+<file path=ppt/slides/slide19.xml><?xml version="1.0" encoding="utf-8"?>
 <p:sld xmlns:a="http://schemas.openxmlformats.org/drawingml/2006/main" xmlns:r="http://schemas.openxmlformats.org/officeDocument/2006/relationships" xmlns:p="http://schemas.openxmlformats.org/presentationml/2006/main">
   <p:cSld>
     <p:spTree>
@@ -7975,425 +8321,6 @@
     <p:extLst>
       <p:ext uri="{BB962C8B-B14F-4D97-AF65-F5344CB8AC3E}">
         <p14:creationId xmlns:p14="http://schemas.microsoft.com/office/powerpoint/2010/main" val="1836470017"/>
-      </p:ext>
-    </p:extLst>
-  </p:cSld>
-  <p:clrMapOvr>
-    <a:masterClrMapping/>
-  </p:clrMapOvr>
-  <p:transition spd="slow">
-    <p:push dir="u"/>
-  </p:transition>
-</p:sld>
-</file>
-
-<file path=ppt/slides/slide18.xml><?xml version="1.0" encoding="utf-8"?>
-<p:sld xmlns:a="http://schemas.openxmlformats.org/drawingml/2006/main" xmlns:r="http://schemas.openxmlformats.org/officeDocument/2006/relationships" xmlns:p="http://schemas.openxmlformats.org/presentationml/2006/main">
-  <p:cSld>
-    <p:spTree>
-      <p:nvGrpSpPr>
-        <p:cNvPr id="1" name=""/>
-        <p:cNvGrpSpPr/>
-        <p:nvPr/>
-      </p:nvGrpSpPr>
-      <p:grpSpPr>
-        <a:xfrm>
-          <a:off x="0" y="0"/>
-          <a:ext cx="0" cy="0"/>
-          <a:chOff x="0" y="0"/>
-          <a:chExt cx="0" cy="0"/>
-        </a:xfrm>
-      </p:grpSpPr>
-      <p:sp>
-        <p:nvSpPr>
-          <p:cNvPr id="2" name="Nadpis 1">
-            <a:extLst>
-              <a:ext uri="{FF2B5EF4-FFF2-40B4-BE49-F238E27FC236}">
-                <a16:creationId xmlns:a16="http://schemas.microsoft.com/office/drawing/2014/main" id="{8F63155E-FCD4-4250-BF5F-490A45229C45}"/>
-              </a:ext>
-            </a:extLst>
-          </p:cNvPr>
-          <p:cNvSpPr>
-            <a:spLocks noGrp="1"/>
-          </p:cNvSpPr>
-          <p:nvPr>
-            <p:ph type="title"/>
-          </p:nvPr>
-        </p:nvSpPr>
-        <p:spPr/>
-        <p:txBody>
-          <a:bodyPr/>
-          <a:lstStyle/>
-          <a:p>
-            <a:r>
-              <a:rPr lang="cs-CZ" dirty="0"/>
-              <a:t>Nasazení online (DEPLOY)</a:t>
-            </a:r>
-          </a:p>
-        </p:txBody>
-      </p:sp>
-      <p:sp>
-        <p:nvSpPr>
-          <p:cNvPr id="3" name="Zástupný symbol pro obsah 2">
-            <a:extLst>
-              <a:ext uri="{FF2B5EF4-FFF2-40B4-BE49-F238E27FC236}">
-                <a16:creationId xmlns:a16="http://schemas.microsoft.com/office/drawing/2014/main" id="{4ECF4641-EB59-4705-A83B-611E4E11A5BD}"/>
-              </a:ext>
-            </a:extLst>
-          </p:cNvPr>
-          <p:cNvSpPr>
-            <a:spLocks noGrp="1"/>
-          </p:cNvSpPr>
-          <p:nvPr>
-            <p:ph idx="1"/>
-          </p:nvPr>
-        </p:nvSpPr>
-        <p:spPr/>
-        <p:txBody>
-          <a:bodyPr>
-            <a:normAutofit lnSpcReduction="10000"/>
-          </a:bodyPr>
-          <a:lstStyle/>
-          <a:p>
-            <a:pPr marL="514350" indent="-514350">
-              <a:lnSpc>
-                <a:spcPct val="150000"/>
-              </a:lnSpc>
-              <a:buFont typeface="+mj-lt"/>
-              <a:buAutoNum type="arabicPeriod"/>
-            </a:pPr>
-            <a:r>
-              <a:rPr lang="cs-CZ" dirty="0"/>
-              <a:t>účet ve službě Azure</a:t>
-            </a:r>
-          </a:p>
-          <a:p>
-            <a:pPr marL="514350" indent="-514350">
-              <a:lnSpc>
-                <a:spcPct val="150000"/>
-              </a:lnSpc>
-              <a:buFont typeface="+mj-lt"/>
-              <a:buAutoNum type="arabicPeriod"/>
-            </a:pPr>
-            <a:endParaRPr lang="cs-CZ" dirty="0"/>
-          </a:p>
-          <a:p>
-            <a:pPr marL="514350" indent="-514350">
-              <a:lnSpc>
-                <a:spcPct val="100000"/>
-              </a:lnSpc>
-              <a:buFont typeface="+mj-lt"/>
-              <a:buAutoNum type="arabicPeriod"/>
-            </a:pPr>
-            <a:r>
-              <a:rPr lang="cs-CZ" dirty="0" err="1"/>
-              <a:t>Visual</a:t>
-            </a:r>
-            <a:r>
-              <a:rPr lang="cs-CZ" dirty="0"/>
-              <a:t> Studio - publikovat:</a:t>
-            </a:r>
-          </a:p>
-          <a:p>
-            <a:pPr lvl="1">
-              <a:lnSpc>
-                <a:spcPct val="100000"/>
-              </a:lnSpc>
-            </a:pPr>
-            <a:r>
-              <a:rPr lang="cs-CZ" dirty="0"/>
-              <a:t>projekt</a:t>
-            </a:r>
-          </a:p>
-          <a:p>
-            <a:pPr lvl="1">
-              <a:lnSpc>
-                <a:spcPct val="100000"/>
-              </a:lnSpc>
-            </a:pPr>
-            <a:r>
-              <a:rPr lang="cs-CZ" dirty="0"/>
-              <a:t>databázi</a:t>
-            </a:r>
-          </a:p>
-          <a:p>
-            <a:pPr lvl="1">
-              <a:lnSpc>
-                <a:spcPct val="100000"/>
-              </a:lnSpc>
-            </a:pPr>
-            <a:endParaRPr lang="cs-CZ" dirty="0"/>
-          </a:p>
-          <a:p>
-            <a:pPr marL="514350" indent="-514350">
-              <a:lnSpc>
-                <a:spcPct val="100000"/>
-              </a:lnSpc>
-              <a:buFont typeface="+mj-lt"/>
-              <a:buAutoNum type="arabicPeriod"/>
-            </a:pPr>
-            <a:r>
-              <a:rPr lang="cs-CZ" dirty="0"/>
-              <a:t>Překopírovat obsah DB</a:t>
-            </a:r>
-          </a:p>
-          <a:p>
-            <a:pPr lvl="1">
-              <a:lnSpc>
-                <a:spcPct val="100000"/>
-              </a:lnSpc>
-            </a:pPr>
-            <a:r>
-              <a:rPr lang="cs-CZ" dirty="0"/>
-              <a:t>struktura</a:t>
-            </a:r>
-          </a:p>
-          <a:p>
-            <a:pPr lvl="1">
-              <a:lnSpc>
-                <a:spcPct val="100000"/>
-              </a:lnSpc>
-            </a:pPr>
-            <a:r>
-              <a:rPr lang="cs-CZ" dirty="0"/>
-              <a:t>data</a:t>
-            </a:r>
-          </a:p>
-        </p:txBody>
-      </p:sp>
-      <p:pic>
-        <p:nvPicPr>
-          <p:cNvPr id="4" name="Obrázek 3">
-            <a:extLst>
-              <a:ext uri="{FF2B5EF4-FFF2-40B4-BE49-F238E27FC236}">
-                <a16:creationId xmlns:a16="http://schemas.microsoft.com/office/drawing/2014/main" id="{C092F47A-97FC-4C9E-BBA6-566EBDA7B5F3}"/>
-              </a:ext>
-            </a:extLst>
-          </p:cNvPr>
-          <p:cNvPicPr>
-            <a:picLocks noChangeAspect="1"/>
-          </p:cNvPicPr>
-          <p:nvPr/>
-        </p:nvPicPr>
-        <p:blipFill>
-          <a:blip r:embed="rId2"/>
-          <a:stretch>
-            <a:fillRect/>
-          </a:stretch>
-        </p:blipFill>
-        <p:spPr>
-          <a:xfrm>
-            <a:off x="5334256" y="1845593"/>
-            <a:ext cx="6565136" cy="4033999"/>
-          </a:xfrm>
-          <a:prstGeom prst="rect">
-            <a:avLst/>
-          </a:prstGeom>
-          <a:ln>
-            <a:solidFill>
-              <a:schemeClr val="tx1"/>
-            </a:solidFill>
-          </a:ln>
-        </p:spPr>
-      </p:pic>
-    </p:spTree>
-    <p:extLst>
-      <p:ext uri="{BB962C8B-B14F-4D97-AF65-F5344CB8AC3E}">
-        <p14:creationId xmlns:p14="http://schemas.microsoft.com/office/powerpoint/2010/main" val="3057881380"/>
-      </p:ext>
-    </p:extLst>
-  </p:cSld>
-  <p:clrMapOvr>
-    <a:masterClrMapping/>
-  </p:clrMapOvr>
-  <p:transition spd="slow">
-    <p:push dir="u"/>
-  </p:transition>
-</p:sld>
-</file>
-
-<file path=ppt/slides/slide19.xml><?xml version="1.0" encoding="utf-8"?>
-<p:sld xmlns:a="http://schemas.openxmlformats.org/drawingml/2006/main" xmlns:r="http://schemas.openxmlformats.org/officeDocument/2006/relationships" xmlns:p="http://schemas.openxmlformats.org/presentationml/2006/main">
-  <p:cSld>
-    <p:spTree>
-      <p:nvGrpSpPr>
-        <p:cNvPr id="1" name=""/>
-        <p:cNvGrpSpPr/>
-        <p:nvPr/>
-      </p:nvGrpSpPr>
-      <p:grpSpPr>
-        <a:xfrm>
-          <a:off x="0" y="0"/>
-          <a:ext cx="0" cy="0"/>
-          <a:chOff x="0" y="0"/>
-          <a:chExt cx="0" cy="0"/>
-        </a:xfrm>
-      </p:grpSpPr>
-      <p:sp>
-        <p:nvSpPr>
-          <p:cNvPr id="2" name="Nadpis 1">
-            <a:extLst>
-              <a:ext uri="{FF2B5EF4-FFF2-40B4-BE49-F238E27FC236}">
-                <a16:creationId xmlns:a16="http://schemas.microsoft.com/office/drawing/2014/main" id="{0BF199A5-8F9E-4476-BE31-12E1A53203E4}"/>
-              </a:ext>
-            </a:extLst>
-          </p:cNvPr>
-          <p:cNvSpPr>
-            <a:spLocks noGrp="1"/>
-          </p:cNvSpPr>
-          <p:nvPr>
-            <p:ph type="title"/>
-          </p:nvPr>
-        </p:nvSpPr>
-        <p:spPr/>
-        <p:txBody>
-          <a:bodyPr/>
-          <a:lstStyle/>
-          <a:p>
-            <a:r>
-              <a:rPr lang="cs-CZ" dirty="0"/>
-              <a:t>Změna kódu + opakované nasazení</a:t>
-            </a:r>
-          </a:p>
-        </p:txBody>
-      </p:sp>
-      <p:sp>
-        <p:nvSpPr>
-          <p:cNvPr id="3" name="Zástupný symbol pro obsah 2">
-            <a:extLst>
-              <a:ext uri="{FF2B5EF4-FFF2-40B4-BE49-F238E27FC236}">
-                <a16:creationId xmlns:a16="http://schemas.microsoft.com/office/drawing/2014/main" id="{BFED2CB1-2532-4F22-B996-C2A6308DD1D7}"/>
-              </a:ext>
-            </a:extLst>
-          </p:cNvPr>
-          <p:cNvSpPr>
-            <a:spLocks noGrp="1"/>
-          </p:cNvSpPr>
-          <p:nvPr>
-            <p:ph idx="1"/>
-          </p:nvPr>
-        </p:nvSpPr>
-        <p:spPr/>
-        <p:txBody>
-          <a:bodyPr/>
-          <a:lstStyle/>
-          <a:p>
-            <a:pPr>
-              <a:lnSpc>
-                <a:spcPct val="150000"/>
-              </a:lnSpc>
-            </a:pPr>
-            <a:r>
-              <a:rPr lang="cs-CZ" dirty="0"/>
-              <a:t>DB – </a:t>
-            </a:r>
-            <a:r>
-              <a:rPr lang="cs-CZ" dirty="0" err="1"/>
-              <a:t>Visual</a:t>
-            </a:r>
-            <a:r>
-              <a:rPr lang="cs-CZ" dirty="0"/>
-              <a:t> Studio – připojení na DB v Azure</a:t>
-            </a:r>
-          </a:p>
-          <a:p>
-            <a:pPr>
-              <a:lnSpc>
-                <a:spcPct val="150000"/>
-              </a:lnSpc>
-            </a:pPr>
-            <a:endParaRPr lang="cs-CZ" dirty="0"/>
-          </a:p>
-          <a:p>
-            <a:pPr>
-              <a:lnSpc>
-                <a:spcPct val="150000"/>
-              </a:lnSpc>
-            </a:pPr>
-            <a:r>
-              <a:rPr lang="cs-CZ" dirty="0"/>
-              <a:t>kód – </a:t>
-            </a:r>
-            <a:r>
-              <a:rPr lang="cs-CZ" dirty="0" err="1"/>
-              <a:t>Visual</a:t>
-            </a:r>
-            <a:r>
-              <a:rPr lang="cs-CZ" dirty="0"/>
-              <a:t> Studio – publikovat</a:t>
-            </a:r>
-          </a:p>
-          <a:p>
-            <a:pPr marL="265113" indent="0">
-              <a:lnSpc>
-                <a:spcPct val="150000"/>
-              </a:lnSpc>
-              <a:buNone/>
-            </a:pPr>
-            <a:r>
-              <a:rPr lang="cs-CZ" dirty="0"/>
-              <a:t>VS.</a:t>
-            </a:r>
-          </a:p>
-          <a:p>
-            <a:pPr>
-              <a:lnSpc>
-                <a:spcPct val="150000"/>
-              </a:lnSpc>
-            </a:pPr>
-            <a:r>
-              <a:rPr lang="cs-CZ" dirty="0" err="1"/>
-              <a:t>GitHub</a:t>
-            </a:r>
-            <a:r>
-              <a:rPr lang="cs-CZ" dirty="0"/>
-              <a:t> – zdroj kódu</a:t>
-            </a:r>
-          </a:p>
-          <a:p>
-            <a:endParaRPr lang="cs-CZ" dirty="0"/>
-          </a:p>
-        </p:txBody>
-      </p:sp>
-      <p:pic>
-        <p:nvPicPr>
-          <p:cNvPr id="4" name="Obrázek 3">
-            <a:extLst>
-              <a:ext uri="{FF2B5EF4-FFF2-40B4-BE49-F238E27FC236}">
-                <a16:creationId xmlns:a16="http://schemas.microsoft.com/office/drawing/2014/main" id="{3B9D16F2-3D3C-42CE-8EE4-05E7B5FA6246}"/>
-              </a:ext>
-            </a:extLst>
-          </p:cNvPr>
-          <p:cNvPicPr>
-            <a:picLocks noChangeAspect="1"/>
-          </p:cNvPicPr>
-          <p:nvPr/>
-        </p:nvPicPr>
-        <p:blipFill>
-          <a:blip r:embed="rId2"/>
-          <a:stretch>
-            <a:fillRect/>
-          </a:stretch>
-        </p:blipFill>
-        <p:spPr>
-          <a:xfrm>
-            <a:off x="8092440" y="1690688"/>
-            <a:ext cx="3331464" cy="4594538"/>
-          </a:xfrm>
-          <a:prstGeom prst="rect">
-            <a:avLst/>
-          </a:prstGeom>
-          <a:ln>
-            <a:solidFill>
-              <a:schemeClr val="tx1"/>
-            </a:solidFill>
-          </a:ln>
-        </p:spPr>
-      </p:pic>
-    </p:spTree>
-    <p:extLst>
-      <p:ext uri="{BB962C8B-B14F-4D97-AF65-F5344CB8AC3E}">
-        <p14:creationId xmlns:p14="http://schemas.microsoft.com/office/powerpoint/2010/main" val="408922911"/>
       </p:ext>
     </p:extLst>
   </p:cSld>
@@ -14891,6 +14818,425 @@
 <file path=ppt/slides/slide20.xml><?xml version="1.0" encoding="utf-8"?>
 <p:sld xmlns:a="http://schemas.openxmlformats.org/drawingml/2006/main" xmlns:r="http://schemas.openxmlformats.org/officeDocument/2006/relationships" xmlns:p="http://schemas.openxmlformats.org/presentationml/2006/main">
   <p:cSld>
+    <p:spTree>
+      <p:nvGrpSpPr>
+        <p:cNvPr id="1" name=""/>
+        <p:cNvGrpSpPr/>
+        <p:nvPr/>
+      </p:nvGrpSpPr>
+      <p:grpSpPr>
+        <a:xfrm>
+          <a:off x="0" y="0"/>
+          <a:ext cx="0" cy="0"/>
+          <a:chOff x="0" y="0"/>
+          <a:chExt cx="0" cy="0"/>
+        </a:xfrm>
+      </p:grpSpPr>
+      <p:sp>
+        <p:nvSpPr>
+          <p:cNvPr id="2" name="Nadpis 1">
+            <a:extLst>
+              <a:ext uri="{FF2B5EF4-FFF2-40B4-BE49-F238E27FC236}">
+                <a16:creationId xmlns:a16="http://schemas.microsoft.com/office/drawing/2014/main" id="{8F63155E-FCD4-4250-BF5F-490A45229C45}"/>
+              </a:ext>
+            </a:extLst>
+          </p:cNvPr>
+          <p:cNvSpPr>
+            <a:spLocks noGrp="1"/>
+          </p:cNvSpPr>
+          <p:nvPr>
+            <p:ph type="title"/>
+          </p:nvPr>
+        </p:nvSpPr>
+        <p:spPr/>
+        <p:txBody>
+          <a:bodyPr/>
+          <a:lstStyle/>
+          <a:p>
+            <a:r>
+              <a:rPr lang="cs-CZ" dirty="0"/>
+              <a:t>Nasazení online (DEPLOY)</a:t>
+            </a:r>
+          </a:p>
+        </p:txBody>
+      </p:sp>
+      <p:sp>
+        <p:nvSpPr>
+          <p:cNvPr id="3" name="Zástupný symbol pro obsah 2">
+            <a:extLst>
+              <a:ext uri="{FF2B5EF4-FFF2-40B4-BE49-F238E27FC236}">
+                <a16:creationId xmlns:a16="http://schemas.microsoft.com/office/drawing/2014/main" id="{4ECF4641-EB59-4705-A83B-611E4E11A5BD}"/>
+              </a:ext>
+            </a:extLst>
+          </p:cNvPr>
+          <p:cNvSpPr>
+            <a:spLocks noGrp="1"/>
+          </p:cNvSpPr>
+          <p:nvPr>
+            <p:ph idx="1"/>
+          </p:nvPr>
+        </p:nvSpPr>
+        <p:spPr/>
+        <p:txBody>
+          <a:bodyPr>
+            <a:normAutofit lnSpcReduction="10000"/>
+          </a:bodyPr>
+          <a:lstStyle/>
+          <a:p>
+            <a:pPr marL="514350" indent="-514350">
+              <a:lnSpc>
+                <a:spcPct val="150000"/>
+              </a:lnSpc>
+              <a:buFont typeface="+mj-lt"/>
+              <a:buAutoNum type="arabicPeriod"/>
+            </a:pPr>
+            <a:r>
+              <a:rPr lang="cs-CZ" dirty="0"/>
+              <a:t>Účet ve službě Azure</a:t>
+            </a:r>
+          </a:p>
+          <a:p>
+            <a:pPr marL="514350" indent="-514350">
+              <a:lnSpc>
+                <a:spcPct val="150000"/>
+              </a:lnSpc>
+              <a:buFont typeface="+mj-lt"/>
+              <a:buAutoNum type="arabicPeriod"/>
+            </a:pPr>
+            <a:endParaRPr lang="cs-CZ" dirty="0"/>
+          </a:p>
+          <a:p>
+            <a:pPr marL="514350" indent="-514350">
+              <a:lnSpc>
+                <a:spcPct val="100000"/>
+              </a:lnSpc>
+              <a:buFont typeface="+mj-lt"/>
+              <a:buAutoNum type="arabicPeriod"/>
+            </a:pPr>
+            <a:r>
+              <a:rPr lang="cs-CZ" dirty="0" err="1"/>
+              <a:t>Visual</a:t>
+            </a:r>
+            <a:r>
+              <a:rPr lang="cs-CZ" dirty="0"/>
+              <a:t> Studio - publikovat:</a:t>
+            </a:r>
+          </a:p>
+          <a:p>
+            <a:pPr lvl="1">
+              <a:lnSpc>
+                <a:spcPct val="100000"/>
+              </a:lnSpc>
+            </a:pPr>
+            <a:r>
+              <a:rPr lang="cs-CZ" dirty="0"/>
+              <a:t>Projekt</a:t>
+            </a:r>
+          </a:p>
+          <a:p>
+            <a:pPr lvl="1">
+              <a:lnSpc>
+                <a:spcPct val="100000"/>
+              </a:lnSpc>
+            </a:pPr>
+            <a:r>
+              <a:rPr lang="cs-CZ" dirty="0"/>
+              <a:t>Databázi</a:t>
+            </a:r>
+          </a:p>
+          <a:p>
+            <a:pPr lvl="1">
+              <a:lnSpc>
+                <a:spcPct val="100000"/>
+              </a:lnSpc>
+            </a:pPr>
+            <a:endParaRPr lang="cs-CZ" dirty="0"/>
+          </a:p>
+          <a:p>
+            <a:pPr marL="514350" indent="-514350">
+              <a:lnSpc>
+                <a:spcPct val="100000"/>
+              </a:lnSpc>
+              <a:buFont typeface="+mj-lt"/>
+              <a:buAutoNum type="arabicPeriod"/>
+            </a:pPr>
+            <a:r>
+              <a:rPr lang="cs-CZ" dirty="0"/>
+              <a:t>Překopírovat obsah DB</a:t>
+            </a:r>
+          </a:p>
+          <a:p>
+            <a:pPr lvl="1">
+              <a:lnSpc>
+                <a:spcPct val="100000"/>
+              </a:lnSpc>
+            </a:pPr>
+            <a:r>
+              <a:rPr lang="cs-CZ" dirty="0"/>
+              <a:t>Strukturu</a:t>
+            </a:r>
+          </a:p>
+          <a:p>
+            <a:pPr lvl="1">
+              <a:lnSpc>
+                <a:spcPct val="100000"/>
+              </a:lnSpc>
+            </a:pPr>
+            <a:r>
+              <a:rPr lang="cs-CZ" dirty="0"/>
+              <a:t>Data</a:t>
+            </a:r>
+          </a:p>
+        </p:txBody>
+      </p:sp>
+      <p:pic>
+        <p:nvPicPr>
+          <p:cNvPr id="4" name="Obrázek 3">
+            <a:extLst>
+              <a:ext uri="{FF2B5EF4-FFF2-40B4-BE49-F238E27FC236}">
+                <a16:creationId xmlns:a16="http://schemas.microsoft.com/office/drawing/2014/main" id="{C092F47A-97FC-4C9E-BBA6-566EBDA7B5F3}"/>
+              </a:ext>
+            </a:extLst>
+          </p:cNvPr>
+          <p:cNvPicPr>
+            <a:picLocks noChangeAspect="1"/>
+          </p:cNvPicPr>
+          <p:nvPr/>
+        </p:nvPicPr>
+        <p:blipFill>
+          <a:blip r:embed="rId2"/>
+          <a:stretch>
+            <a:fillRect/>
+          </a:stretch>
+        </p:blipFill>
+        <p:spPr>
+          <a:xfrm>
+            <a:off x="5334256" y="1845593"/>
+            <a:ext cx="6565136" cy="4033999"/>
+          </a:xfrm>
+          <a:prstGeom prst="rect">
+            <a:avLst/>
+          </a:prstGeom>
+          <a:ln>
+            <a:solidFill>
+              <a:schemeClr val="tx1"/>
+            </a:solidFill>
+          </a:ln>
+        </p:spPr>
+      </p:pic>
+    </p:spTree>
+    <p:extLst>
+      <p:ext uri="{BB962C8B-B14F-4D97-AF65-F5344CB8AC3E}">
+        <p14:creationId xmlns:p14="http://schemas.microsoft.com/office/powerpoint/2010/main" val="3057881380"/>
+      </p:ext>
+    </p:extLst>
+  </p:cSld>
+  <p:clrMapOvr>
+    <a:masterClrMapping/>
+  </p:clrMapOvr>
+  <p:transition spd="slow">
+    <p:push dir="u"/>
+  </p:transition>
+</p:sld>
+</file>
+
+<file path=ppt/slides/slide21.xml><?xml version="1.0" encoding="utf-8"?>
+<p:sld xmlns:a="http://schemas.openxmlformats.org/drawingml/2006/main" xmlns:r="http://schemas.openxmlformats.org/officeDocument/2006/relationships" xmlns:p="http://schemas.openxmlformats.org/presentationml/2006/main">
+  <p:cSld>
+    <p:spTree>
+      <p:nvGrpSpPr>
+        <p:cNvPr id="1" name=""/>
+        <p:cNvGrpSpPr/>
+        <p:nvPr/>
+      </p:nvGrpSpPr>
+      <p:grpSpPr>
+        <a:xfrm>
+          <a:off x="0" y="0"/>
+          <a:ext cx="0" cy="0"/>
+          <a:chOff x="0" y="0"/>
+          <a:chExt cx="0" cy="0"/>
+        </a:xfrm>
+      </p:grpSpPr>
+      <p:sp>
+        <p:nvSpPr>
+          <p:cNvPr id="2" name="Nadpis 1">
+            <a:extLst>
+              <a:ext uri="{FF2B5EF4-FFF2-40B4-BE49-F238E27FC236}">
+                <a16:creationId xmlns:a16="http://schemas.microsoft.com/office/drawing/2014/main" id="{0BF199A5-8F9E-4476-BE31-12E1A53203E4}"/>
+              </a:ext>
+            </a:extLst>
+          </p:cNvPr>
+          <p:cNvSpPr>
+            <a:spLocks noGrp="1"/>
+          </p:cNvSpPr>
+          <p:nvPr>
+            <p:ph type="title"/>
+          </p:nvPr>
+        </p:nvSpPr>
+        <p:spPr/>
+        <p:txBody>
+          <a:bodyPr/>
+          <a:lstStyle/>
+          <a:p>
+            <a:r>
+              <a:rPr lang="cs-CZ" dirty="0"/>
+              <a:t>Změna kódu + opakované nasazení</a:t>
+            </a:r>
+          </a:p>
+        </p:txBody>
+      </p:sp>
+      <p:sp>
+        <p:nvSpPr>
+          <p:cNvPr id="3" name="Zástupný symbol pro obsah 2">
+            <a:extLst>
+              <a:ext uri="{FF2B5EF4-FFF2-40B4-BE49-F238E27FC236}">
+                <a16:creationId xmlns:a16="http://schemas.microsoft.com/office/drawing/2014/main" id="{BFED2CB1-2532-4F22-B996-C2A6308DD1D7}"/>
+              </a:ext>
+            </a:extLst>
+          </p:cNvPr>
+          <p:cNvSpPr>
+            <a:spLocks noGrp="1"/>
+          </p:cNvSpPr>
+          <p:nvPr>
+            <p:ph idx="1"/>
+          </p:nvPr>
+        </p:nvSpPr>
+        <p:spPr/>
+        <p:txBody>
+          <a:bodyPr/>
+          <a:lstStyle/>
+          <a:p>
+            <a:pPr>
+              <a:lnSpc>
+                <a:spcPct val="150000"/>
+              </a:lnSpc>
+            </a:pPr>
+            <a:r>
+              <a:rPr lang="cs-CZ" dirty="0"/>
+              <a:t>DB – </a:t>
+            </a:r>
+            <a:r>
+              <a:rPr lang="cs-CZ" dirty="0" err="1"/>
+              <a:t>Visual</a:t>
+            </a:r>
+            <a:r>
+              <a:rPr lang="cs-CZ" dirty="0"/>
+              <a:t> Studio – připojení na DB v Azure</a:t>
+            </a:r>
+          </a:p>
+          <a:p>
+            <a:pPr>
+              <a:lnSpc>
+                <a:spcPct val="150000"/>
+              </a:lnSpc>
+            </a:pPr>
+            <a:endParaRPr lang="cs-CZ" dirty="0"/>
+          </a:p>
+          <a:p>
+            <a:pPr>
+              <a:lnSpc>
+                <a:spcPct val="150000"/>
+              </a:lnSpc>
+            </a:pPr>
+            <a:r>
+              <a:rPr lang="cs-CZ" dirty="0"/>
+              <a:t>Kód – </a:t>
+            </a:r>
+            <a:r>
+              <a:rPr lang="cs-CZ" dirty="0" err="1"/>
+              <a:t>Visual</a:t>
+            </a:r>
+            <a:r>
+              <a:rPr lang="cs-CZ" dirty="0"/>
+              <a:t> Studio – publikovat</a:t>
+            </a:r>
+          </a:p>
+          <a:p>
+            <a:pPr marL="265113" indent="0">
+              <a:lnSpc>
+                <a:spcPct val="150000"/>
+              </a:lnSpc>
+              <a:buNone/>
+            </a:pPr>
+            <a:r>
+              <a:rPr lang="cs-CZ" dirty="0"/>
+              <a:t>VS</a:t>
+            </a:r>
+          </a:p>
+          <a:p>
+            <a:pPr>
+              <a:lnSpc>
+                <a:spcPct val="150000"/>
+              </a:lnSpc>
+            </a:pPr>
+            <a:r>
+              <a:rPr lang="cs-CZ" dirty="0" err="1"/>
+              <a:t>GitHub</a:t>
+            </a:r>
+            <a:r>
+              <a:rPr lang="cs-CZ" dirty="0"/>
+              <a:t> – zdroj kódu</a:t>
+            </a:r>
+          </a:p>
+          <a:p>
+            <a:endParaRPr lang="cs-CZ" dirty="0"/>
+          </a:p>
+        </p:txBody>
+      </p:sp>
+      <p:pic>
+        <p:nvPicPr>
+          <p:cNvPr id="4" name="Obrázek 3">
+            <a:extLst>
+              <a:ext uri="{FF2B5EF4-FFF2-40B4-BE49-F238E27FC236}">
+                <a16:creationId xmlns:a16="http://schemas.microsoft.com/office/drawing/2014/main" id="{3B9D16F2-3D3C-42CE-8EE4-05E7B5FA6246}"/>
+              </a:ext>
+            </a:extLst>
+          </p:cNvPr>
+          <p:cNvPicPr>
+            <a:picLocks noChangeAspect="1"/>
+          </p:cNvPicPr>
+          <p:nvPr/>
+        </p:nvPicPr>
+        <p:blipFill>
+          <a:blip r:embed="rId2"/>
+          <a:stretch>
+            <a:fillRect/>
+          </a:stretch>
+        </p:blipFill>
+        <p:spPr>
+          <a:xfrm>
+            <a:off x="8092440" y="1690688"/>
+            <a:ext cx="3331464" cy="4594538"/>
+          </a:xfrm>
+          <a:prstGeom prst="rect">
+            <a:avLst/>
+          </a:prstGeom>
+          <a:ln>
+            <a:solidFill>
+              <a:schemeClr val="tx1"/>
+            </a:solidFill>
+          </a:ln>
+        </p:spPr>
+      </p:pic>
+    </p:spTree>
+    <p:extLst>
+      <p:ext uri="{BB962C8B-B14F-4D97-AF65-F5344CB8AC3E}">
+        <p14:creationId xmlns:p14="http://schemas.microsoft.com/office/powerpoint/2010/main" val="408922911"/>
+      </p:ext>
+    </p:extLst>
+  </p:cSld>
+  <p:clrMapOvr>
+    <a:masterClrMapping/>
+  </p:clrMapOvr>
+  <p:transition spd="slow">
+    <p:push dir="u"/>
+  </p:transition>
+</p:sld>
+</file>
+
+<file path=ppt/slides/slide22.xml><?xml version="1.0" encoding="utf-8"?>
+<p:sld xmlns:a="http://schemas.openxmlformats.org/drawingml/2006/main" xmlns:r="http://schemas.openxmlformats.org/officeDocument/2006/relationships" xmlns:p="http://schemas.openxmlformats.org/presentationml/2006/main">
+  <p:cSld>
     <p:bg>
       <p:bgPr>
         <a:solidFill>
@@ -24344,12 +24690,28 @@
           <a:p>
             <a:pPr algn="r"/>
             <a:r>
-              <a:rPr lang="en-US">
+              <a:rPr lang="en-US" dirty="0">
                 <a:solidFill>
                   <a:schemeClr val="tx2"/>
                 </a:solidFill>
               </a:rPr>
-              <a:t>KÓDOVÁNÍ A IMPLEMENTACE NA WEB</a:t>
+              <a:t>KÓDOVÁNÍ A</a:t>
+            </a:r>
+            <a:r>
+              <a:rPr lang="cs-CZ" dirty="0">
+                <a:solidFill>
+                  <a:schemeClr val="tx2"/>
+                </a:solidFill>
+              </a:rPr>
+              <a:t> </a:t>
+            </a:r>
+            <a:r>
+              <a:rPr lang="en-US" dirty="0">
+                <a:solidFill>
+                  <a:schemeClr val="tx2"/>
+                </a:solidFill>
+              </a:rPr>
+              <a:t>IMPLEMENTACE NA WEB</a:t>
             </a:r>
           </a:p>
         </p:txBody>
@@ -28651,19 +29013,25 @@
           <a:bodyPr/>
           <a:lstStyle/>
           <a:p>
+            <a:pPr>
+              <a:lnSpc>
+                <a:spcPct val="250000"/>
+              </a:lnSpc>
+            </a:pPr>
             <a:r>
               <a:rPr lang="cs-CZ" dirty="0"/>
               <a:t>Vytvoření akceptačních kritérií</a:t>
             </a:r>
           </a:p>
           <a:p>
-            <a:r>
-              <a:rPr lang="cs-CZ"/>
-              <a:t>Upravení úkol</a:t>
-            </a:r>
+            <a:pPr>
+              <a:lnSpc>
+                <a:spcPct val="250000"/>
+              </a:lnSpc>
+            </a:pPr>
             <a:r>
               <a:rPr lang="cs-CZ" dirty="0"/>
-              <a:t>ů</a:t>
+              <a:t>Upravení úkolů</a:t>
             </a:r>
           </a:p>
         </p:txBody>

</xml_diff>